<commit_message>
Updates for Ankara Training
</commit_message>
<xml_diff>
--- a/slides/KeyStone NETCP PA.pptx
+++ b/slides/KeyStone NETCP PA.pptx
@@ -287,10 +287,10 @@
             </a:lvl1pPr>
           </a:lstStyle>
           <a:p>
-            <a:fld id="{0D52C1B0-B041-4D75-A50F-1B9D3CE5301C}" type="datetimeFigureOut">
+            <a:fld id="{C4243DA2-409E-466F-935D-A70D0972ADE2}" type="datetimeFigureOut">
               <a:rPr lang="en-US"/>
               <a:pPr/>
-              <a:t>2/8/2012</a:t>
+              <a:t>3/6/2012</a:t>
             </a:fld>
             <a:endParaRPr lang="en-US"/>
           </a:p>
@@ -378,7 +378,7 @@
             </a:lvl1pPr>
           </a:lstStyle>
           <a:p>
-            <a:fld id="{2EBCE529-1C33-4816-A8E5-D418851ED0E6}" type="slidenum">
+            <a:fld id="{165031C7-46A4-40D5-B47F-79DDD51F8E65}" type="slidenum">
               <a:rPr lang="en-US"/>
               <a:pPr/>
               <a:t>‹#›</a:t>
@@ -681,7 +681,7 @@
             </a:lvl1pPr>
           </a:lstStyle>
           <a:p>
-            <a:fld id="{AA476370-E976-4911-82F4-F16E90933558}" type="slidenum">
+            <a:fld id="{A1F52BA9-DCA8-424F-99F2-6F1ED5796441}" type="slidenum">
               <a:rPr lang="en-US"/>
               <a:pPr/>
               <a:t>‹#›</a:t>
@@ -911,7 +911,7 @@
           <a:bodyPr/>
           <a:lstStyle/>
           <a:p>
-            <a:fld id="{0DFD341D-80FE-41A2-8B11-D0F61A0B510F}" type="slidenum">
+            <a:fld id="{B306C636-8A70-4EB4-960D-D7A22151FA07}" type="slidenum">
               <a:rPr lang="en-US"/>
               <a:pPr/>
               <a:t>10</a:t>
@@ -1072,7 +1072,7 @@
           <a:bodyPr/>
           <a:lstStyle/>
           <a:p>
-            <a:fld id="{2A833259-873B-4B91-BCAB-4046489CA40B}" type="slidenum">
+            <a:fld id="{03F9C715-D87F-49BE-A38B-2B220083F5B5}" type="slidenum">
               <a:rPr lang="en-US"/>
               <a:pPr/>
               <a:t>11</a:t>
@@ -1233,7 +1233,7 @@
           <a:lstStyle/>
           <a:p>
             <a:pPr defTabSz="957263"/>
-            <a:fld id="{50A06652-5855-4B8A-A014-D1396E127DDC}" type="slidenum">
+            <a:fld id="{A0EE3805-B242-4AD6-B964-A2367F57B1C7}" type="slidenum">
               <a:rPr lang="en-US" sz="1200"/>
               <a:pPr defTabSz="957263"/>
               <a:t>12</a:t>
@@ -1319,7 +1319,7 @@
           <a:bodyPr/>
           <a:lstStyle/>
           <a:p>
-            <a:fld id="{4423F2C9-5113-4F32-8815-E631879EC416}" type="slidenum">
+            <a:fld id="{482B35DF-C459-4B89-829A-7941B97CFBED}" type="slidenum">
               <a:rPr lang="en-US"/>
               <a:pPr/>
               <a:t>13</a:t>
@@ -1420,7 +1420,7 @@
           <a:bodyPr/>
           <a:lstStyle/>
           <a:p>
-            <a:fld id="{D9A19E13-A4FD-4720-A9BF-5288CFD4344E}" type="slidenum">
+            <a:fld id="{A8634C64-1467-4D53-B588-B98B6AEE8D11}" type="slidenum">
               <a:rPr lang="en-US"/>
               <a:pPr/>
               <a:t>14</a:t>
@@ -1532,7 +1532,7 @@
           <a:bodyPr/>
           <a:lstStyle/>
           <a:p>
-            <a:fld id="{8371CBF5-5495-4DFD-957D-742AA2114EC3}" type="slidenum">
+            <a:fld id="{60389E9A-4C92-4854-9079-14D0D562ACA2}" type="slidenum">
               <a:rPr lang="en-US"/>
               <a:pPr/>
               <a:t>15</a:t>
@@ -1654,7 +1654,7 @@
           <a:bodyPr/>
           <a:lstStyle/>
           <a:p>
-            <a:fld id="{49373E89-03B8-43DD-9E82-1CED0FB07A9A}" type="slidenum">
+            <a:fld id="{35ECE477-797D-48BD-8B6E-9A94CB5CE89B}" type="slidenum">
               <a:rPr lang="en-US"/>
               <a:pPr/>
               <a:t>16</a:t>
@@ -1815,7 +1815,7 @@
           <a:lstStyle/>
           <a:p>
             <a:pPr defTabSz="957263"/>
-            <a:fld id="{070424D4-D80D-4A13-B2E6-1F6B038E9E4A}" type="slidenum">
+            <a:fld id="{2FA551F7-6C17-4AF8-9838-7D18EE4C501B}" type="slidenum">
               <a:rPr lang="en-US" sz="1200"/>
               <a:pPr defTabSz="957263"/>
               <a:t>17</a:t>
@@ -1901,7 +1901,7 @@
           <a:bodyPr/>
           <a:lstStyle/>
           <a:p>
-            <a:fld id="{B6B2452E-D04C-4980-9D99-69BEE72AA5AF}" type="slidenum">
+            <a:fld id="{12A340CA-D275-4C5E-800B-34D1BBD2F071}" type="slidenum">
               <a:rPr lang="en-US"/>
               <a:pPr/>
               <a:t>18</a:t>
@@ -2062,7 +2062,7 @@
           <a:bodyPr/>
           <a:lstStyle/>
           <a:p>
-            <a:fld id="{2BAF334F-7537-4264-A401-FCCD1B1D1505}" type="slidenum">
+            <a:fld id="{E1D573B1-B1B4-4BD5-A2DB-6EC19EBE3E34}" type="slidenum">
               <a:rPr lang="en-US"/>
               <a:pPr/>
               <a:t>19</a:t>
@@ -2388,7 +2388,7 @@
           <a:bodyPr/>
           <a:lstStyle/>
           <a:p>
-            <a:fld id="{9CF3ECC7-D1E6-412E-87CF-412CAFDF2F86}" type="slidenum">
+            <a:fld id="{DF02657A-8E82-47EB-B299-7FE9DABE83C3}" type="slidenum">
               <a:rPr lang="en-US"/>
               <a:pPr/>
               <a:t>2</a:t>
@@ -2474,7 +2474,7 @@
           <a:bodyPr/>
           <a:lstStyle/>
           <a:p>
-            <a:fld id="{725851A3-1872-4A4A-AD68-85EBA0DE84BD}" type="slidenum">
+            <a:fld id="{A5B5BFC1-9168-44B9-A1D9-3FF17694E11F}" type="slidenum">
               <a:rPr lang="en-US"/>
               <a:pPr/>
               <a:t>20</a:t>
@@ -2755,7 +2755,7 @@
           <a:lstStyle/>
           <a:p>
             <a:pPr defTabSz="957263"/>
-            <a:fld id="{8122959F-1BBA-4C30-9D0A-8D0407597FA7}" type="slidenum">
+            <a:fld id="{42DC77D4-7926-44F5-BD92-E31FCE1FECCC}" type="slidenum">
               <a:rPr lang="en-US" sz="1200"/>
               <a:pPr defTabSz="957263"/>
               <a:t>21</a:t>
@@ -2901,7 +2901,7 @@
           <a:lstStyle/>
           <a:p>
             <a:pPr defTabSz="957263"/>
-            <a:fld id="{0C139010-BF07-44F0-BD56-CAACD43170A6}" type="slidenum">
+            <a:fld id="{18DC8420-A270-4132-A022-BF7B4A0D45FB}" type="slidenum">
               <a:rPr lang="en-US" sz="1200"/>
               <a:pPr defTabSz="957263"/>
               <a:t>22</a:t>
@@ -3069,7 +3069,7 @@
           <a:lstStyle/>
           <a:p>
             <a:pPr defTabSz="957263"/>
-            <a:fld id="{9F14B049-0ED8-47E9-8B9A-DA97B711A866}" type="slidenum">
+            <a:fld id="{1EE4AF01-5BDE-4B87-960E-2757470ED829}" type="slidenum">
               <a:rPr lang="en-US" sz="1200"/>
               <a:pPr defTabSz="957263"/>
               <a:t>23</a:t>
@@ -3237,7 +3237,7 @@
           <a:lstStyle/>
           <a:p>
             <a:pPr defTabSz="957263"/>
-            <a:fld id="{6ED500F5-D12E-4FAB-A4FC-8BC030B23963}" type="slidenum">
+            <a:fld id="{E3356EC0-0980-4A86-8A71-EFE2A377018C}" type="slidenum">
               <a:rPr lang="en-US" sz="1200"/>
               <a:pPr defTabSz="957263"/>
               <a:t>24</a:t>
@@ -3394,7 +3394,7 @@
           <a:lstStyle/>
           <a:p>
             <a:pPr defTabSz="957263"/>
-            <a:fld id="{FB3A7C24-1E47-48F4-A1A0-59E16F95E738}" type="slidenum">
+            <a:fld id="{62DC6764-E5A6-4F5D-9BE0-1872CA67F938}" type="slidenum">
               <a:rPr lang="en-US" sz="1200"/>
               <a:pPr defTabSz="957263"/>
               <a:t>25</a:t>
@@ -3555,7 +3555,7 @@
           <a:lstStyle/>
           <a:p>
             <a:pPr defTabSz="957263"/>
-            <a:fld id="{8463F5A1-83DA-4381-A40D-B274548FE793}" type="slidenum">
+            <a:fld id="{8F05D7FC-0281-4D9E-B5F1-D49F7B184855}" type="slidenum">
               <a:rPr lang="en-US" sz="1200"/>
               <a:pPr defTabSz="957263"/>
               <a:t>26</a:t>
@@ -3737,7 +3737,7 @@
           <a:lstStyle/>
           <a:p>
             <a:pPr defTabSz="957263"/>
-            <a:fld id="{994B36EA-E364-47F2-9AC2-CDC918C4C210}" type="slidenum">
+            <a:fld id="{3AEC169D-6797-49E6-9C53-B792C90C5580}" type="slidenum">
               <a:rPr lang="en-US" sz="1200"/>
               <a:pPr defTabSz="957263"/>
               <a:t>27</a:t>
@@ -3912,7 +3912,7 @@
           <a:lstStyle/>
           <a:p>
             <a:pPr defTabSz="957263"/>
-            <a:fld id="{CB5A1C6C-4F01-4F26-B74C-180C2A06FB15}" type="slidenum">
+            <a:fld id="{E1FB49E4-EBA3-46A2-9223-624ED0E60BD6}" type="slidenum">
               <a:rPr lang="en-US" sz="1200"/>
               <a:pPr defTabSz="957263"/>
               <a:t>28</a:t>
@@ -4095,7 +4095,7 @@
           <a:bodyPr/>
           <a:lstStyle/>
           <a:p>
-            <a:fld id="{715247A3-B3AA-489C-ACD4-8DE34C596B24}" type="slidenum">
+            <a:fld id="{31651AC3-BF97-48B1-AA6A-0C07C5BA663C}" type="slidenum">
               <a:rPr lang="en-US"/>
               <a:pPr/>
               <a:t>29</a:t>
@@ -4246,7 +4246,7 @@
           <a:lstStyle/>
           <a:p>
             <a:pPr defTabSz="957263"/>
-            <a:fld id="{5DC69679-1D45-479F-BA16-ACECA94C82B9}" type="slidenum">
+            <a:fld id="{79BE1059-0845-4C0B-874B-AB140446E37F}" type="slidenum">
               <a:rPr lang="en-US" sz="1200"/>
               <a:pPr defTabSz="957263"/>
               <a:t>3</a:t>
@@ -4332,7 +4332,7 @@
           <a:bodyPr/>
           <a:lstStyle/>
           <a:p>
-            <a:fld id="{2B201042-7320-43C0-B52D-93E79B8665B4}" type="slidenum">
+            <a:fld id="{A211B42F-8A5D-4BAA-8D4C-6799A5F948DE}" type="slidenum">
               <a:rPr lang="en-US"/>
               <a:pPr/>
               <a:t>30</a:t>
@@ -4540,7 +4540,7 @@
           <a:lstStyle/>
           <a:p>
             <a:pPr defTabSz="957263"/>
-            <a:fld id="{A78DE2EE-C22E-4614-92A2-6E4CD92AE315}" type="slidenum">
+            <a:fld id="{BBD6B8F1-DABA-43A6-BA0F-3BAE5C60F13B}" type="slidenum">
               <a:rPr lang="en-US" sz="1200"/>
               <a:pPr defTabSz="957263"/>
               <a:t>31</a:t>
@@ -4690,7 +4690,7 @@
           <a:lstStyle/>
           <a:p>
             <a:pPr defTabSz="957263"/>
-            <a:fld id="{9040A3FD-0A5E-4C56-9B20-B7044559C76E}" type="slidenum">
+            <a:fld id="{1CEF2CBB-BCC3-4181-8619-229FFABB2B66}" type="slidenum">
               <a:rPr lang="en-US" sz="1200"/>
               <a:pPr defTabSz="957263"/>
               <a:t>32</a:t>
@@ -4865,7 +4865,7 @@
           <a:lstStyle/>
           <a:p>
             <a:pPr defTabSz="957263"/>
-            <a:fld id="{E11F9F0B-D598-40CC-A56E-A6E92E0840A2}" type="slidenum">
+            <a:fld id="{7670DD49-E025-469E-B775-1A5BD463005A}" type="slidenum">
               <a:rPr lang="en-US" sz="1200"/>
               <a:pPr defTabSz="957263"/>
               <a:t>33</a:t>
@@ -5051,7 +5051,7 @@
           <a:bodyPr/>
           <a:lstStyle/>
           <a:p>
-            <a:fld id="{4BC7196A-C6AB-4361-BF04-CB96E446E49C}" type="slidenum">
+            <a:fld id="{4420598D-C86C-4704-8B8A-2E9593A8E04C}" type="slidenum">
               <a:rPr lang="en-US"/>
               <a:pPr/>
               <a:t>4</a:t>
@@ -5197,7 +5197,7 @@
           <a:lstStyle/>
           <a:p>
             <a:pPr defTabSz="957263"/>
-            <a:fld id="{73FAC7F7-DD38-4B57-A4A0-B0E635203CB6}" type="slidenum">
+            <a:fld id="{60C92717-052F-4134-B780-CE273B534627}" type="slidenum">
               <a:rPr lang="en-US" sz="1200"/>
               <a:pPr defTabSz="957263"/>
               <a:t>5</a:t>
@@ -5297,7 +5297,7 @@
           <a:lstStyle/>
           <a:p>
             <a:pPr defTabSz="957263"/>
-            <a:fld id="{6CE9688C-7B9C-4B3F-A1FC-F914ED609706}" type="slidenum">
+            <a:fld id="{73CA6677-4894-47DE-AEE5-3B2A20C23B3A}" type="slidenum">
               <a:rPr lang="en-US" sz="1200"/>
               <a:pPr defTabSz="957263"/>
               <a:t>6</a:t>
@@ -5394,7 +5394,7 @@
           <a:lstStyle/>
           <a:p>
             <a:pPr defTabSz="957263"/>
-            <a:fld id="{1882E211-522D-4264-95DA-C38DA6DBEF7B}" type="slidenum">
+            <a:fld id="{C02E066D-A9FB-4574-A4E7-B0FB77057B6A}" type="slidenum">
               <a:rPr lang="en-US" sz="1200"/>
               <a:pPr defTabSz="957263"/>
               <a:t>7</a:t>
@@ -5494,7 +5494,7 @@
           <a:lstStyle/>
           <a:p>
             <a:pPr defTabSz="957263"/>
-            <a:fld id="{91FECBE6-D891-46BE-916F-CEF6C30F15C4}" type="slidenum">
+            <a:fld id="{FA122197-FE7B-40DE-A389-29C7F0D1D278}" type="slidenum">
               <a:rPr lang="en-US" sz="1200"/>
               <a:pPr defTabSz="957263"/>
               <a:t>8</a:t>
@@ -5591,7 +5591,7 @@
           <a:lstStyle/>
           <a:p>
             <a:pPr defTabSz="957263"/>
-            <a:fld id="{A7D5F347-6B58-4FBD-9BE3-CB844C4D2B52}" type="slidenum">
+            <a:fld id="{DC47BC56-9BAC-4160-BF39-EDDA7C471B24}" type="slidenum">
               <a:rPr lang="en-US" sz="1200"/>
               <a:pPr defTabSz="957263"/>
               <a:t>9</a:t>
@@ -6100,7 +6100,7 @@
             <a:pPr>
               <a:defRPr/>
             </a:pPr>
-            <a:fld id="{8D6251DB-A48C-4CF1-BA39-89E7E3864F09}" type="slidenum">
+            <a:fld id="{41E60B44-E352-437C-AFE7-64F4913D5636}" type="slidenum">
               <a:rPr lang="en-US"/>
               <a:pPr>
                 <a:defRPr/>
@@ -6511,7 +6511,7 @@
             <a:pPr>
               <a:defRPr/>
             </a:pPr>
-            <a:fld id="{F6A271BD-250A-4352-B9C9-5C918E569243}" type="slidenum">
+            <a:fld id="{A79D2B17-C8C5-4311-A320-74D74131956A}" type="slidenum">
               <a:rPr lang="en-US"/>
               <a:pPr>
                 <a:defRPr/>
@@ -6833,7 +6833,7 @@
             <a:pPr>
               <a:defRPr/>
             </a:pPr>
-            <a:fld id="{62830E4A-34B4-4B4F-A0D2-75322DA3C995}" type="slidenum">
+            <a:fld id="{D591A0BD-895F-4B31-9418-CE6AB8D3D177}" type="slidenum">
               <a:rPr lang="en-US"/>
               <a:pPr>
                 <a:defRPr/>
@@ -7125,7 +7125,7 @@
             <a:pPr>
               <a:defRPr/>
             </a:pPr>
-            <a:fld id="{C42B9531-E29C-4D86-8133-1F5A90D80375}" type="slidenum">
+            <a:fld id="{17B05540-D62D-4FC8-B5D8-562596D51A2A}" type="slidenum">
               <a:rPr lang="en-US"/>
               <a:pPr>
                 <a:defRPr/>
@@ -7593,7 +7593,7 @@
             <a:pPr>
               <a:defRPr/>
             </a:pPr>
-            <a:fld id="{C1288A15-9A72-4733-AFEB-B156824E5CC4}" type="slidenum">
+            <a:fld id="{3031DA8C-389E-47DD-9A1F-5E51AF48155A}" type="slidenum">
               <a:rPr lang="en-US"/>
               <a:pPr>
                 <a:defRPr/>
@@ -7862,7 +7862,7 @@
             <a:pPr>
               <a:defRPr/>
             </a:pPr>
-            <a:fld id="{C780F9E9-9928-4205-B38E-CB62CF61A15E}" type="slidenum">
+            <a:fld id="{3B8780FC-E213-4175-8477-1CE019E2CD31}" type="slidenum">
               <a:rPr lang="en-US"/>
               <a:pPr>
                 <a:defRPr/>
@@ -10720,7 +10720,7 @@
                           <a:latin typeface="Arial" charset="0"/>
                           <a:ea typeface="宋体" pitchFamily="2" charset="-122"/>
                           <a:cs typeface="Arial" charset="0"/>
-                          <a:hlinkClick r:id="rId7" action="ppaction://hlinkfile"/>
+                          <a:hlinkClick r:id="rId5" action="ppaction://hlinkfile"/>
                         </a:rPr>
                         <a:t>Pa_create</a:t>
                       </a:r>
@@ -10751,7 +10751,7 @@
                           <a:latin typeface="Arial" charset="0"/>
                           <a:ea typeface="宋体" pitchFamily="2" charset="-122"/>
                           <a:cs typeface="Arial" charset="0"/>
-                          <a:hlinkClick r:id="rId8" action="ppaction://hlinkfile"/>
+                          <a:hlinkClick r:id="rId7" action="ppaction://hlinkfile"/>
                         </a:rPr>
                         <a:t>paConfig_t</a:t>
                       </a:r>
@@ -10782,7 +10782,7 @@
                           <a:latin typeface="Arial" charset="0"/>
                           <a:ea typeface="宋体" pitchFamily="2" charset="-122"/>
                           <a:cs typeface="Arial" charset="0"/>
-                          <a:hlinkClick r:id="rId9" action="ppaction://hlinkfile"/>
+                          <a:hlinkClick r:id="rId4" action="ppaction://hlinkfile"/>
                         </a:rPr>
                         <a:t>Pa_Handle</a:t>
                       </a:r>
@@ -11138,7 +11138,7 @@
                           <a:latin typeface="Arial" charset="0"/>
                           <a:ea typeface="宋体" pitchFamily="2" charset="-122"/>
                           <a:cs typeface="Arial" charset="0"/>
-                          <a:hlinkClick r:id="rId10" action="ppaction://hlinkfile"/>
+                          <a:hlinkClick r:id="rId5" action="ppaction://hlinkfile"/>
                         </a:rPr>
                         <a:t>Pa_close</a:t>
                       </a:r>
@@ -11169,7 +11169,7 @@
                           <a:latin typeface="Arial" charset="0"/>
                           <a:ea typeface="宋体" pitchFamily="2" charset="-122"/>
                           <a:cs typeface="Arial" charset="0"/>
-                          <a:hlinkClick r:id="rId9" action="ppaction://hlinkfile"/>
+                          <a:hlinkClick r:id="rId4" action="ppaction://hlinkfile"/>
                         </a:rPr>
                         <a:t>Pa_Handle</a:t>
                       </a:r>
@@ -11525,7 +11525,7 @@
                           <a:latin typeface="Arial" charset="0"/>
                           <a:ea typeface="宋体" pitchFamily="2" charset="-122"/>
                           <a:cs typeface="Arial" charset="0"/>
-                          <a:hlinkClick r:id="rId11" action="ppaction://hlinkfile"/>
+                          <a:hlinkClick r:id="rId5" action="ppaction://hlinkfile"/>
                         </a:rPr>
                         <a:t>Pa_requestStats</a:t>
                       </a:r>
@@ -11556,7 +11556,7 @@
                           <a:latin typeface="Arial" charset="0"/>
                           <a:ea typeface="宋体" pitchFamily="2" charset="-122"/>
                           <a:cs typeface="Arial" charset="0"/>
-                          <a:hlinkClick r:id="rId9" action="ppaction://hlinkfile"/>
+                          <a:hlinkClick r:id="rId4" action="ppaction://hlinkfile"/>
                         </a:rPr>
                         <a:t>Pa_Handle</a:t>
                       </a:r>
@@ -11587,7 +11587,7 @@
                           <a:latin typeface="Arial" charset="0"/>
                           <a:ea typeface="宋体" pitchFamily="2" charset="-122"/>
                           <a:cs typeface="Arial" charset="0"/>
-                          <a:hlinkClick r:id="rId12" action="ppaction://hlinkfile"/>
+                          <a:hlinkClick r:id="rId4" action="ppaction://hlinkfile"/>
                         </a:rPr>
                         <a:t>paCmd_t</a:t>
                       </a:r>
@@ -11618,7 +11618,7 @@
                           <a:latin typeface="Arial" charset="0"/>
                           <a:ea typeface="宋体" pitchFamily="2" charset="-122"/>
                           <a:cs typeface="Arial" charset="0"/>
-                          <a:hlinkClick r:id="rId13" action="ppaction://hlinkfile"/>
+                          <a:hlinkClick r:id="rId8" action="ppaction://hlinkfile"/>
                         </a:rPr>
                         <a:t>paCmdReply_t</a:t>
                       </a:r>
@@ -11878,7 +11878,7 @@
                           <a:latin typeface="Arial" charset="0"/>
                           <a:ea typeface="宋体" pitchFamily="2" charset="-122"/>
                           <a:cs typeface="Arial" charset="0"/>
-                          <a:hlinkClick r:id="rId14" action="ppaction://hlinkfile"/>
+                          <a:hlinkClick r:id="rId9" action="ppaction://hlinkfile"/>
                         </a:rPr>
                         <a:t>paSysStats_t</a:t>
                       </a:r>
@@ -11974,7 +11974,7 @@
                           <a:latin typeface="Arial" charset="0"/>
                           <a:ea typeface="宋体" pitchFamily="2" charset="-122"/>
                           <a:cs typeface="Arial" charset="0"/>
-                          <a:hlinkClick r:id="rId15" action="ppaction://hlinkfile"/>
+                          <a:hlinkClick r:id="rId5" action="ppaction://hlinkfile"/>
                         </a:rPr>
                         <a:t>Pa_formatStatsReply</a:t>
                       </a:r>
@@ -12005,7 +12005,7 @@
                           <a:latin typeface="Arial" charset="0"/>
                           <a:ea typeface="宋体" pitchFamily="2" charset="-122"/>
                           <a:cs typeface="Arial" charset="0"/>
-                          <a:hlinkClick r:id="rId9" action="ppaction://hlinkfile"/>
+                          <a:hlinkClick r:id="rId4" action="ppaction://hlinkfile"/>
                         </a:rPr>
                         <a:t>Pa_Handle</a:t>
                       </a:r>
@@ -12036,7 +12036,7 @@
                           <a:latin typeface="Arial" charset="0"/>
                           <a:ea typeface="宋体" pitchFamily="2" charset="-122"/>
                           <a:cs typeface="Arial" charset="0"/>
-                          <a:hlinkClick r:id="rId12" action="ppaction://hlinkfile"/>
+                          <a:hlinkClick r:id="rId4" action="ppaction://hlinkfile"/>
                         </a:rPr>
                         <a:t>paCmd_t</a:t>
                       </a:r>
@@ -12296,7 +12296,7 @@
                           <a:latin typeface="Arial" charset="0"/>
                           <a:ea typeface="宋体" pitchFamily="2" charset="-122"/>
                           <a:cs typeface="Arial" charset="0"/>
-                          <a:hlinkClick r:id="rId16" action="ppaction://hlinkfile"/>
+                          <a:hlinkClick r:id="rId4" action="ppaction://hlinkfile"/>
                         </a:rPr>
                         <a:t>paSSstate_t</a:t>
                       </a:r>
@@ -12392,7 +12392,7 @@
                           <a:latin typeface="Arial" charset="0"/>
                           <a:ea typeface="宋体" pitchFamily="2" charset="-122"/>
                           <a:cs typeface="Arial" charset="0"/>
-                          <a:hlinkClick r:id="rId17" action="ppaction://hlinkfile"/>
+                          <a:hlinkClick r:id="rId5" action="ppaction://hlinkfile"/>
                         </a:rPr>
                         <a:t>Pa_resetControl</a:t>
                       </a:r>
@@ -12423,7 +12423,7 @@
                           <a:latin typeface="Arial" charset="0"/>
                           <a:ea typeface="宋体" pitchFamily="2" charset="-122"/>
                           <a:cs typeface="Arial" charset="0"/>
-                          <a:hlinkClick r:id="rId16" action="ppaction://hlinkfile"/>
+                          <a:hlinkClick r:id="rId4" action="ppaction://hlinkfile"/>
                         </a:rPr>
                         <a:t>paSSstate_t</a:t>
                       </a:r>
@@ -12779,7 +12779,7 @@
                           <a:latin typeface="Arial" charset="0"/>
                           <a:ea typeface="宋体" pitchFamily="2" charset="-122"/>
                           <a:cs typeface="Arial" charset="0"/>
-                          <a:hlinkClick r:id="rId18" action="ppaction://hlinkfile"/>
+                          <a:hlinkClick r:id="rId5" action="ppaction://hlinkfile"/>
                         </a:rPr>
                         <a:t>Pa_downloadImage</a:t>
                       </a:r>
@@ -13276,7 +13276,7 @@
                           <a:latin typeface="Arial" charset="0"/>
                           <a:ea typeface="宋体" pitchFamily="2" charset="-122"/>
                           <a:cs typeface="Arial" charset="0"/>
-                          <a:hlinkClick r:id="rId6" action="ppaction://hlinkfile"/>
+                          <a:hlinkClick r:id="rId4" action="ppaction://hlinkfile"/>
                         </a:rPr>
                         <a:t>Pa_Handle</a:t>
                       </a:r>
@@ -13307,7 +13307,7 @@
                           <a:latin typeface="Arial" charset="0"/>
                           <a:ea typeface="宋体" pitchFamily="2" charset="-122"/>
                           <a:cs typeface="Arial" charset="0"/>
-                          <a:hlinkClick r:id="rId7" action="ppaction://hlinkfile"/>
+                          <a:hlinkClick r:id="rId6" action="ppaction://hlinkfile"/>
                         </a:rPr>
                         <a:t>paEthInfo_t</a:t>
                       </a:r>
@@ -13338,7 +13338,7 @@
                           <a:latin typeface="Arial" charset="0"/>
                           <a:ea typeface="宋体" pitchFamily="2" charset="-122"/>
                           <a:cs typeface="Arial" charset="0"/>
-                          <a:hlinkClick r:id="rId8" action="ppaction://hlinkfile"/>
+                          <a:hlinkClick r:id="rId7" action="ppaction://hlinkfile"/>
                         </a:rPr>
                         <a:t>paRouteInfo_t</a:t>
                       </a:r>
@@ -13369,7 +13369,7 @@
                           <a:latin typeface="Arial" charset="0"/>
                           <a:ea typeface="宋体" pitchFamily="2" charset="-122"/>
                           <a:cs typeface="Arial" charset="0"/>
-                          <a:hlinkClick r:id="rId8" action="ppaction://hlinkfile"/>
+                          <a:hlinkClick r:id="rId7" action="ppaction://hlinkfile"/>
                         </a:rPr>
                         <a:t>paRouteInfo_t</a:t>
                       </a:r>
@@ -13400,7 +13400,7 @@
                           <a:latin typeface="Arial" charset="0"/>
                           <a:ea typeface="宋体" pitchFamily="2" charset="-122"/>
                           <a:cs typeface="Arial" charset="0"/>
-                          <a:hlinkClick r:id="rId9" action="ppaction://hlinkfile"/>
+                          <a:hlinkClick r:id="rId4" action="ppaction://hlinkfile"/>
                         </a:rPr>
                         <a:t>paHandleL2L3_t</a:t>
                       </a:r>
@@ -13431,7 +13431,7 @@
                           <a:latin typeface="Arial" charset="0"/>
                           <a:ea typeface="宋体" pitchFamily="2" charset="-122"/>
                           <a:cs typeface="Arial" charset="0"/>
-                          <a:hlinkClick r:id="rId10" action="ppaction://hlinkfile"/>
+                          <a:hlinkClick r:id="rId4" action="ppaction://hlinkfile"/>
                         </a:rPr>
                         <a:t>paCmd_t</a:t>
                       </a:r>
@@ -13462,7 +13462,7 @@
                           <a:latin typeface="Arial" charset="0"/>
                           <a:ea typeface="宋体" pitchFamily="2" charset="-122"/>
                           <a:cs typeface="Arial" charset="0"/>
-                          <a:hlinkClick r:id="rId11" action="ppaction://hlinkfile"/>
+                          <a:hlinkClick r:id="rId8" action="ppaction://hlinkfile"/>
                         </a:rPr>
                         <a:t>paCmdReply_t</a:t>
                       </a:r>
@@ -13818,7 +13818,7 @@
                           <a:latin typeface="Arial" charset="0"/>
                           <a:ea typeface="宋体" pitchFamily="2" charset="-122"/>
                           <a:cs typeface="Arial" charset="0"/>
-                          <a:hlinkClick r:id="rId12" action="ppaction://hlinkfile"/>
+                          <a:hlinkClick r:id="rId5" action="ppaction://hlinkfile"/>
                         </a:rPr>
                         <a:t>Pa_delHandle</a:t>
                       </a:r>
@@ -13849,7 +13849,7 @@
                           <a:latin typeface="Arial" charset="0"/>
                           <a:ea typeface="宋体" pitchFamily="2" charset="-122"/>
                           <a:cs typeface="Arial" charset="0"/>
-                          <a:hlinkClick r:id="rId6" action="ppaction://hlinkfile"/>
+                          <a:hlinkClick r:id="rId4" action="ppaction://hlinkfile"/>
                         </a:rPr>
                         <a:t>Pa_Handle</a:t>
                       </a:r>
@@ -13880,7 +13880,7 @@
                           <a:latin typeface="Arial" charset="0"/>
                           <a:ea typeface="宋体" pitchFamily="2" charset="-122"/>
                           <a:cs typeface="Arial" charset="0"/>
-                          <a:hlinkClick r:id="rId9" action="ppaction://hlinkfile"/>
+                          <a:hlinkClick r:id="rId4" action="ppaction://hlinkfile"/>
                         </a:rPr>
                         <a:t>paHandleL2L3_t</a:t>
                       </a:r>
@@ -13911,7 +13911,7 @@
                           <a:latin typeface="Arial" charset="0"/>
                           <a:ea typeface="宋体" pitchFamily="2" charset="-122"/>
                           <a:cs typeface="Arial" charset="0"/>
-                          <a:hlinkClick r:id="rId10" action="ppaction://hlinkfile"/>
+                          <a:hlinkClick r:id="rId4" action="ppaction://hlinkfile"/>
                         </a:rPr>
                         <a:t>paCmd_t</a:t>
                       </a:r>
@@ -13942,7 +13942,7 @@
                           <a:latin typeface="Arial" charset="0"/>
                           <a:ea typeface="宋体" pitchFamily="2" charset="-122"/>
                           <a:cs typeface="Arial" charset="0"/>
-                          <a:hlinkClick r:id="rId11" action="ppaction://hlinkfile"/>
+                          <a:hlinkClick r:id="rId8" action="ppaction://hlinkfile"/>
                         </a:rPr>
                         <a:t>paCmdReply_t</a:t>
                       </a:r>
@@ -14298,7 +14298,7 @@
                           <a:latin typeface="Arial" charset="0"/>
                           <a:ea typeface="宋体" pitchFamily="2" charset="-122"/>
                           <a:cs typeface="Arial" charset="0"/>
-                          <a:hlinkClick r:id="rId13" action="ppaction://hlinkfile"/>
+                          <a:hlinkClick r:id="rId5" action="ppaction://hlinkfile"/>
                         </a:rPr>
                         <a:t>Pa_delL4Handle</a:t>
                       </a:r>
@@ -14329,7 +14329,7 @@
                           <a:latin typeface="Arial" charset="0"/>
                           <a:ea typeface="宋体" pitchFamily="2" charset="-122"/>
                           <a:cs typeface="Arial" charset="0"/>
-                          <a:hlinkClick r:id="rId6" action="ppaction://hlinkfile"/>
+                          <a:hlinkClick r:id="rId4" action="ppaction://hlinkfile"/>
                         </a:rPr>
                         <a:t>Pa_Handle</a:t>
                       </a:r>
@@ -14360,7 +14360,7 @@
                           <a:latin typeface="Arial" charset="0"/>
                           <a:ea typeface="宋体" pitchFamily="2" charset="-122"/>
                           <a:cs typeface="Arial" charset="0"/>
-                          <a:hlinkClick r:id="rId14" action="ppaction://hlinkfile"/>
+                          <a:hlinkClick r:id="rId4" action="ppaction://hlinkfile"/>
                         </a:rPr>
                         <a:t>paHandleL4_t</a:t>
                       </a:r>
@@ -14391,7 +14391,7 @@
                           <a:latin typeface="Arial" charset="0"/>
                           <a:ea typeface="宋体" pitchFamily="2" charset="-122"/>
                           <a:cs typeface="Arial" charset="0"/>
-                          <a:hlinkClick r:id="rId10" action="ppaction://hlinkfile"/>
+                          <a:hlinkClick r:id="rId4" action="ppaction://hlinkfile"/>
                         </a:rPr>
                         <a:t>paCmd_t</a:t>
                       </a:r>
@@ -14422,7 +14422,7 @@
                           <a:latin typeface="Arial" charset="0"/>
                           <a:ea typeface="宋体" pitchFamily="2" charset="-122"/>
                           <a:cs typeface="Arial" charset="0"/>
-                          <a:hlinkClick r:id="rId11" action="ppaction://hlinkfile"/>
+                          <a:hlinkClick r:id="rId8" action="ppaction://hlinkfile"/>
                         </a:rPr>
                         <a:t>paCmdReply_t</a:t>
                       </a:r>
@@ -14778,7 +14778,7 @@
                           <a:latin typeface="Arial" charset="0"/>
                           <a:ea typeface="宋体" pitchFamily="2" charset="-122"/>
                           <a:cs typeface="Arial" charset="0"/>
-                          <a:hlinkClick r:id="rId15" action="ppaction://hlinkfile"/>
+                          <a:hlinkClick r:id="rId5" action="ppaction://hlinkfile"/>
                         </a:rPr>
                         <a:t>Pa_addIp</a:t>
                       </a:r>
@@ -14809,7 +14809,7 @@
                           <a:latin typeface="Arial" charset="0"/>
                           <a:ea typeface="宋体" pitchFamily="2" charset="-122"/>
                           <a:cs typeface="Arial" charset="0"/>
-                          <a:hlinkClick r:id="rId6" action="ppaction://hlinkfile"/>
+                          <a:hlinkClick r:id="rId4" action="ppaction://hlinkfile"/>
                         </a:rPr>
                         <a:t>Pa_Handle</a:t>
                       </a:r>
@@ -14840,7 +14840,7 @@
                           <a:latin typeface="Arial" charset="0"/>
                           <a:ea typeface="宋体" pitchFamily="2" charset="-122"/>
                           <a:cs typeface="Arial" charset="0"/>
-                          <a:hlinkClick r:id="rId16" action="ppaction://hlinkfile"/>
+                          <a:hlinkClick r:id="rId9" action="ppaction://hlinkfile"/>
                         </a:rPr>
                         <a:t>paIpInfo_t</a:t>
                       </a:r>
@@ -14871,7 +14871,7 @@
                           <a:latin typeface="Arial" charset="0"/>
                           <a:ea typeface="宋体" pitchFamily="2" charset="-122"/>
                           <a:cs typeface="Arial" charset="0"/>
-                          <a:hlinkClick r:id="rId9" action="ppaction://hlinkfile"/>
+                          <a:hlinkClick r:id="rId4" action="ppaction://hlinkfile"/>
                         </a:rPr>
                         <a:t>paHandleL2L3_t</a:t>
                       </a:r>
@@ -14902,7 +14902,7 @@
                           <a:latin typeface="Arial" charset="0"/>
                           <a:ea typeface="宋体" pitchFamily="2" charset="-122"/>
                           <a:cs typeface="Arial" charset="0"/>
-                          <a:hlinkClick r:id="rId8" action="ppaction://hlinkfile"/>
+                          <a:hlinkClick r:id="rId7" action="ppaction://hlinkfile"/>
                         </a:rPr>
                         <a:t>paRouteInfo_t</a:t>
                       </a:r>
@@ -14933,7 +14933,7 @@
                           <a:latin typeface="Arial" charset="0"/>
                           <a:ea typeface="宋体" pitchFamily="2" charset="-122"/>
                           <a:cs typeface="Arial" charset="0"/>
-                          <a:hlinkClick r:id="rId8" action="ppaction://hlinkfile"/>
+                          <a:hlinkClick r:id="rId7" action="ppaction://hlinkfile"/>
                         </a:rPr>
                         <a:t>paRouteInfo_t</a:t>
                       </a:r>
@@ -14964,7 +14964,7 @@
                           <a:latin typeface="Arial" charset="0"/>
                           <a:ea typeface="宋体" pitchFamily="2" charset="-122"/>
                           <a:cs typeface="Arial" charset="0"/>
-                          <a:hlinkClick r:id="rId9" action="ppaction://hlinkfile"/>
+                          <a:hlinkClick r:id="rId4" action="ppaction://hlinkfile"/>
                         </a:rPr>
                         <a:t>paHandleL2L3_t</a:t>
                       </a:r>
@@ -14995,7 +14995,7 @@
                           <a:latin typeface="Arial" charset="0"/>
                           <a:ea typeface="宋体" pitchFamily="2" charset="-122"/>
                           <a:cs typeface="Arial" charset="0"/>
-                          <a:hlinkClick r:id="rId10" action="ppaction://hlinkfile"/>
+                          <a:hlinkClick r:id="rId4" action="ppaction://hlinkfile"/>
                         </a:rPr>
                         <a:t>paCmd_t</a:t>
                       </a:r>
@@ -15026,7 +15026,7 @@
                           <a:latin typeface="Arial" charset="0"/>
                           <a:ea typeface="宋体" pitchFamily="2" charset="-122"/>
                           <a:cs typeface="Arial" charset="0"/>
-                          <a:hlinkClick r:id="rId11" action="ppaction://hlinkfile"/>
+                          <a:hlinkClick r:id="rId8" action="ppaction://hlinkfile"/>
                         </a:rPr>
                         <a:t>paCmdReply_t</a:t>
                       </a:r>
@@ -15382,7 +15382,7 @@
                           <a:latin typeface="Arial" charset="0"/>
                           <a:ea typeface="宋体" pitchFamily="2" charset="-122"/>
                           <a:cs typeface="Arial" charset="0"/>
-                          <a:hlinkClick r:id="rId17" action="ppaction://hlinkfile"/>
+                          <a:hlinkClick r:id="rId5" action="ppaction://hlinkfile"/>
                         </a:rPr>
                         <a:t>Pa_addPort</a:t>
                       </a:r>
@@ -15413,7 +15413,7 @@
                           <a:latin typeface="Arial" charset="0"/>
                           <a:ea typeface="宋体" pitchFamily="2" charset="-122"/>
                           <a:cs typeface="Arial" charset="0"/>
-                          <a:hlinkClick r:id="rId6" action="ppaction://hlinkfile"/>
+                          <a:hlinkClick r:id="rId4" action="ppaction://hlinkfile"/>
                         </a:rPr>
                         <a:t>Pa_Handle</a:t>
                       </a:r>
@@ -15444,7 +15444,7 @@
                           <a:latin typeface="Arial" charset="0"/>
                           <a:ea typeface="宋体" pitchFamily="2" charset="-122"/>
                           <a:cs typeface="Arial" charset="0"/>
-                          <a:hlinkClick r:id="rId9" action="ppaction://hlinkfile"/>
+                          <a:hlinkClick r:id="rId4" action="ppaction://hlinkfile"/>
                         </a:rPr>
                         <a:t>paHandleL2L3_t</a:t>
                       </a:r>
@@ -15475,7 +15475,7 @@
                           <a:latin typeface="Arial" charset="0"/>
                           <a:ea typeface="宋体" pitchFamily="2" charset="-122"/>
                           <a:cs typeface="Arial" charset="0"/>
-                          <a:hlinkClick r:id="rId8" action="ppaction://hlinkfile"/>
+                          <a:hlinkClick r:id="rId7" action="ppaction://hlinkfile"/>
                         </a:rPr>
                         <a:t>paRouteInfo_t</a:t>
                       </a:r>
@@ -15506,7 +15506,7 @@
                           <a:latin typeface="Arial" charset="0"/>
                           <a:ea typeface="宋体" pitchFamily="2" charset="-122"/>
                           <a:cs typeface="Arial" charset="0"/>
-                          <a:hlinkClick r:id="rId14" action="ppaction://hlinkfile"/>
+                          <a:hlinkClick r:id="rId4" action="ppaction://hlinkfile"/>
                         </a:rPr>
                         <a:t>paHandleL4_t</a:t>
                       </a:r>
@@ -15537,7 +15537,7 @@
                           <a:latin typeface="Arial" charset="0"/>
                           <a:ea typeface="宋体" pitchFamily="2" charset="-122"/>
                           <a:cs typeface="Arial" charset="0"/>
-                          <a:hlinkClick r:id="rId10" action="ppaction://hlinkfile"/>
+                          <a:hlinkClick r:id="rId4" action="ppaction://hlinkfile"/>
                         </a:rPr>
                         <a:t>paCmd_t</a:t>
                       </a:r>
@@ -15568,7 +15568,7 @@
                           <a:latin typeface="Arial" charset="0"/>
                           <a:ea typeface="宋体" pitchFamily="2" charset="-122"/>
                           <a:cs typeface="Arial" charset="0"/>
-                          <a:hlinkClick r:id="rId11" action="ppaction://hlinkfile"/>
+                          <a:hlinkClick r:id="rId8" action="ppaction://hlinkfile"/>
                         </a:rPr>
                         <a:t>paCmdReply_t</a:t>
                       </a:r>
@@ -15924,7 +15924,7 @@
                           <a:latin typeface="Arial" charset="0"/>
                           <a:ea typeface="宋体" pitchFamily="2" charset="-122"/>
                           <a:cs typeface="Arial" charset="0"/>
-                          <a:hlinkClick r:id="rId18" action="ppaction://hlinkfile"/>
+                          <a:hlinkClick r:id="rId5" action="ppaction://hlinkfile"/>
                         </a:rPr>
                         <a:t>Pa_forwardResult</a:t>
                       </a:r>
@@ -15955,7 +15955,7 @@
                           <a:latin typeface="Arial" charset="0"/>
                           <a:ea typeface="宋体" pitchFamily="2" charset="-122"/>
                           <a:cs typeface="Arial" charset="0"/>
-                          <a:hlinkClick r:id="rId6" action="ppaction://hlinkfile"/>
+                          <a:hlinkClick r:id="rId4" action="ppaction://hlinkfile"/>
                         </a:rPr>
                         <a:t>Pa_Handle</a:t>
                       </a:r>
@@ -15986,7 +15986,7 @@
                           <a:latin typeface="Arial" charset="0"/>
                           <a:ea typeface="宋体" pitchFamily="2" charset="-122"/>
                           <a:cs typeface="Arial" charset="0"/>
-                          <a:hlinkClick r:id="rId19" action="ppaction://hlinkfile"/>
+                          <a:hlinkClick r:id="rId10" action="ppaction://hlinkfile"/>
                         </a:rPr>
                         <a:t>paHandle_t</a:t>
                       </a:r>
@@ -16342,7 +16342,7 @@
                           <a:latin typeface="Arial" charset="0"/>
                           <a:ea typeface="宋体" pitchFamily="2" charset="-122"/>
                           <a:cs typeface="Arial" charset="0"/>
-                          <a:hlinkClick r:id="rId20" action="ppaction://hlinkfile"/>
+                          <a:hlinkClick r:id="rId5" action="ppaction://hlinkfile"/>
                         </a:rPr>
                         <a:t>Pa_configRouteErrPacket</a:t>
                       </a:r>
@@ -16373,7 +16373,7 @@
                           <a:latin typeface="Arial" charset="0"/>
                           <a:ea typeface="宋体" pitchFamily="2" charset="-122"/>
                           <a:cs typeface="Arial" charset="0"/>
-                          <a:hlinkClick r:id="rId6" action="ppaction://hlinkfile"/>
+                          <a:hlinkClick r:id="rId4" action="ppaction://hlinkfile"/>
                         </a:rPr>
                         <a:t>Pa_Handle</a:t>
                       </a:r>
@@ -16404,7 +16404,7 @@
                           <a:latin typeface="Arial" charset="0"/>
                           <a:ea typeface="宋体" pitchFamily="2" charset="-122"/>
                           <a:cs typeface="Arial" charset="0"/>
-                          <a:hlinkClick r:id="rId8" action="ppaction://hlinkfile"/>
+                          <a:hlinkClick r:id="rId7" action="ppaction://hlinkfile"/>
                         </a:rPr>
                         <a:t>paRouteInfo_t</a:t>
                       </a:r>
@@ -16435,7 +16435,7 @@
                           <a:latin typeface="Arial" charset="0"/>
                           <a:ea typeface="宋体" pitchFamily="2" charset="-122"/>
                           <a:cs typeface="Arial" charset="0"/>
-                          <a:hlinkClick r:id="rId10" action="ppaction://hlinkfile"/>
+                          <a:hlinkClick r:id="rId4" action="ppaction://hlinkfile"/>
                         </a:rPr>
                         <a:t>paCmd_t</a:t>
                       </a:r>
@@ -16466,7 +16466,7 @@
                           <a:latin typeface="Arial" charset="0"/>
                           <a:ea typeface="宋体" pitchFamily="2" charset="-122"/>
                           <a:cs typeface="Arial" charset="0"/>
-                          <a:hlinkClick r:id="rId11" action="ppaction://hlinkfile"/>
+                          <a:hlinkClick r:id="rId8" action="ppaction://hlinkfile"/>
                         </a:rPr>
                         <a:t>paCmdReply_t</a:t>
                       </a:r>
@@ -16963,7 +16963,7 @@
                           <a:latin typeface="Arial" charset="0"/>
                           <a:ea typeface="宋体" pitchFamily="2" charset="-122"/>
                           <a:cs typeface="Arial" charset="0"/>
-                          <a:hlinkClick r:id="rId6" action="ppaction://hlinkfile"/>
+                          <a:hlinkClick r:id="rId4" action="ppaction://hlinkfile"/>
                         </a:rPr>
                         <a:t>Pa_Handle</a:t>
                       </a:r>
@@ -16994,7 +16994,7 @@
                           <a:latin typeface="Arial" charset="0"/>
                           <a:ea typeface="宋体" pitchFamily="2" charset="-122"/>
                           <a:cs typeface="Arial" charset="0"/>
-                          <a:hlinkClick r:id="rId7" action="ppaction://hlinkfile"/>
+                          <a:hlinkClick r:id="rId4" action="ppaction://hlinkfile"/>
                         </a:rPr>
                         <a:t>paCmd_t</a:t>
                       </a:r>
@@ -17025,7 +17025,7 @@
                           <a:latin typeface="Arial" charset="0"/>
                           <a:ea typeface="宋体" pitchFamily="2" charset="-122"/>
                           <a:cs typeface="Arial" charset="0"/>
-                          <a:hlinkClick r:id="rId8" action="ppaction://hlinkfile"/>
+                          <a:hlinkClick r:id="rId6" action="ppaction://hlinkfile"/>
                         </a:rPr>
                         <a:t>paCmdReply_t</a:t>
                       </a:r>
@@ -17381,7 +17381,7 @@
                           <a:latin typeface="Arial" charset="0"/>
                           <a:ea typeface="宋体" pitchFamily="2" charset="-122"/>
                           <a:cs typeface="Arial" charset="0"/>
-                          <a:hlinkClick r:id="rId9" action="ppaction://hlinkfile"/>
+                          <a:hlinkClick r:id="rId5" action="ppaction://hlinkfile"/>
                         </a:rPr>
                         <a:t>Pa_addCustomL3</a:t>
                       </a:r>
@@ -17412,7 +17412,7 @@
                           <a:latin typeface="Arial" charset="0"/>
                           <a:ea typeface="宋体" pitchFamily="2" charset="-122"/>
                           <a:cs typeface="Arial" charset="0"/>
-                          <a:hlinkClick r:id="rId6" action="ppaction://hlinkfile"/>
+                          <a:hlinkClick r:id="rId4" action="ppaction://hlinkfile"/>
                         </a:rPr>
                         <a:t>Pa_Handle</a:t>
                       </a:r>
@@ -17443,7 +17443,7 @@
                           <a:latin typeface="Arial" charset="0"/>
                           <a:ea typeface="宋体" pitchFamily="2" charset="-122"/>
                           <a:cs typeface="Arial" charset="0"/>
-                          <a:hlinkClick r:id="rId10" action="ppaction://hlinkfile"/>
+                          <a:hlinkClick r:id="rId7" action="ppaction://hlinkfile"/>
                         </a:rPr>
                         <a:t>paRouteInfo_t</a:t>
                       </a:r>
@@ -17474,7 +17474,7 @@
                           <a:latin typeface="Arial" charset="0"/>
                           <a:ea typeface="宋体" pitchFamily="2" charset="-122"/>
                           <a:cs typeface="Arial" charset="0"/>
-                          <a:hlinkClick r:id="rId10" action="ppaction://hlinkfile"/>
+                          <a:hlinkClick r:id="rId7" action="ppaction://hlinkfile"/>
                         </a:rPr>
                         <a:t>paRouteInfo_t</a:t>
                       </a:r>
@@ -17505,7 +17505,7 @@
                           <a:latin typeface="Arial" charset="0"/>
                           <a:ea typeface="宋体" pitchFamily="2" charset="-122"/>
                           <a:cs typeface="Arial" charset="0"/>
-                          <a:hlinkClick r:id="rId11" action="ppaction://hlinkfile"/>
+                          <a:hlinkClick r:id="rId4" action="ppaction://hlinkfile"/>
                         </a:rPr>
                         <a:t>paHandleL2L3_t</a:t>
                       </a:r>
@@ -17536,7 +17536,7 @@
                           <a:latin typeface="Arial" charset="0"/>
                           <a:ea typeface="宋体" pitchFamily="2" charset="-122"/>
                           <a:cs typeface="Arial" charset="0"/>
-                          <a:hlinkClick r:id="rId11" action="ppaction://hlinkfile"/>
+                          <a:hlinkClick r:id="rId4" action="ppaction://hlinkfile"/>
                         </a:rPr>
                         <a:t>paHandleL2L3_t</a:t>
                       </a:r>
@@ -17567,7 +17567,7 @@
                           <a:latin typeface="Arial" charset="0"/>
                           <a:ea typeface="宋体" pitchFamily="2" charset="-122"/>
                           <a:cs typeface="Arial" charset="0"/>
-                          <a:hlinkClick r:id="rId7" action="ppaction://hlinkfile"/>
+                          <a:hlinkClick r:id="rId4" action="ppaction://hlinkfile"/>
                         </a:rPr>
                         <a:t>paCmd_t</a:t>
                       </a:r>
@@ -17598,7 +17598,7 @@
                           <a:latin typeface="Arial" charset="0"/>
                           <a:ea typeface="宋体" pitchFamily="2" charset="-122"/>
                           <a:cs typeface="Arial" charset="0"/>
-                          <a:hlinkClick r:id="rId8" action="ppaction://hlinkfile"/>
+                          <a:hlinkClick r:id="rId6" action="ppaction://hlinkfile"/>
                         </a:rPr>
                         <a:t>paCmdReply_t</a:t>
                       </a:r>
@@ -17954,7 +17954,7 @@
                           <a:latin typeface="Arial" charset="0"/>
                           <a:ea typeface="宋体" pitchFamily="2" charset="-122"/>
                           <a:cs typeface="Arial" charset="0"/>
-                          <a:hlinkClick r:id="rId12" action="ppaction://hlinkfile"/>
+                          <a:hlinkClick r:id="rId5" action="ppaction://hlinkfile"/>
                         </a:rPr>
                         <a:t>Pa_setCustomL4</a:t>
                       </a:r>
@@ -17985,7 +17985,7 @@
                           <a:latin typeface="Arial" charset="0"/>
                           <a:ea typeface="宋体" pitchFamily="2" charset="-122"/>
                           <a:cs typeface="Arial" charset="0"/>
-                          <a:hlinkClick r:id="rId6" action="ppaction://hlinkfile"/>
+                          <a:hlinkClick r:id="rId4" action="ppaction://hlinkfile"/>
                         </a:rPr>
                         <a:t>Pa_Handle</a:t>
                       </a:r>
@@ -18016,7 +18016,7 @@
                           <a:latin typeface="Arial" charset="0"/>
                           <a:ea typeface="宋体" pitchFamily="2" charset="-122"/>
                           <a:cs typeface="Arial" charset="0"/>
-                          <a:hlinkClick r:id="rId7" action="ppaction://hlinkfile"/>
+                          <a:hlinkClick r:id="rId4" action="ppaction://hlinkfile"/>
                         </a:rPr>
                         <a:t>paCmd_t</a:t>
                       </a:r>
@@ -18047,7 +18047,7 @@
                           <a:latin typeface="Arial" charset="0"/>
                           <a:ea typeface="宋体" pitchFamily="2" charset="-122"/>
                           <a:cs typeface="Arial" charset="0"/>
-                          <a:hlinkClick r:id="rId8" action="ppaction://hlinkfile"/>
+                          <a:hlinkClick r:id="rId6" action="ppaction://hlinkfile"/>
                         </a:rPr>
                         <a:t>paCmdReply_t</a:t>
                       </a:r>
@@ -18403,7 +18403,7 @@
                           <a:latin typeface="Arial" charset="0"/>
                           <a:ea typeface="宋体" pitchFamily="2" charset="-122"/>
                           <a:cs typeface="Arial" charset="0"/>
-                          <a:hlinkClick r:id="rId13" action="ppaction://hlinkfile"/>
+                          <a:hlinkClick r:id="rId5" action="ppaction://hlinkfile"/>
                         </a:rPr>
                         <a:t>Pa_addCustomL4</a:t>
                       </a:r>
@@ -18434,7 +18434,7 @@
                           <a:latin typeface="Arial" charset="0"/>
                           <a:ea typeface="宋体" pitchFamily="2" charset="-122"/>
                           <a:cs typeface="Arial" charset="0"/>
-                          <a:hlinkClick r:id="rId6" action="ppaction://hlinkfile"/>
+                          <a:hlinkClick r:id="rId4" action="ppaction://hlinkfile"/>
                         </a:rPr>
                         <a:t>Pa_Handle</a:t>
                       </a:r>
@@ -18465,7 +18465,7 @@
                           <a:latin typeface="Arial" charset="0"/>
                           <a:ea typeface="宋体" pitchFamily="2" charset="-122"/>
                           <a:cs typeface="Arial" charset="0"/>
-                          <a:hlinkClick r:id="rId11" action="ppaction://hlinkfile"/>
+                          <a:hlinkClick r:id="rId4" action="ppaction://hlinkfile"/>
                         </a:rPr>
                         <a:t>paHandleL2L3_t</a:t>
                       </a:r>
@@ -18496,7 +18496,7 @@
                           <a:latin typeface="Arial" charset="0"/>
                           <a:ea typeface="宋体" pitchFamily="2" charset="-122"/>
                           <a:cs typeface="Arial" charset="0"/>
-                          <a:hlinkClick r:id="rId10" action="ppaction://hlinkfile"/>
+                          <a:hlinkClick r:id="rId7" action="ppaction://hlinkfile"/>
                         </a:rPr>
                         <a:t>paRouteInfo_t</a:t>
                       </a:r>
@@ -18527,7 +18527,7 @@
                           <a:latin typeface="Arial" charset="0"/>
                           <a:ea typeface="宋体" pitchFamily="2" charset="-122"/>
                           <a:cs typeface="Arial" charset="0"/>
-                          <a:hlinkClick r:id="rId14" action="ppaction://hlinkfile"/>
+                          <a:hlinkClick r:id="rId4" action="ppaction://hlinkfile"/>
                         </a:rPr>
                         <a:t>paHandleL4_t</a:t>
                       </a:r>
@@ -18558,7 +18558,7 @@
                           <a:latin typeface="Arial" charset="0"/>
                           <a:ea typeface="宋体" pitchFamily="2" charset="-122"/>
                           <a:cs typeface="Arial" charset="0"/>
-                          <a:hlinkClick r:id="rId7" action="ppaction://hlinkfile"/>
+                          <a:hlinkClick r:id="rId4" action="ppaction://hlinkfile"/>
                         </a:rPr>
                         <a:t>paCmd_t</a:t>
                       </a:r>
@@ -18589,7 +18589,7 @@
                           <a:latin typeface="Arial" charset="0"/>
                           <a:ea typeface="宋体" pitchFamily="2" charset="-122"/>
                           <a:cs typeface="Arial" charset="0"/>
-                          <a:hlinkClick r:id="rId8" action="ppaction://hlinkfile"/>
+                          <a:hlinkClick r:id="rId6" action="ppaction://hlinkfile"/>
                         </a:rPr>
                         <a:t>paCmdReply_t</a:t>
                       </a:r>
@@ -19469,7 +19469,7 @@
                           <a:latin typeface="Arial" charset="0"/>
                           <a:ea typeface="宋体" pitchFamily="2" charset="-122"/>
                           <a:cs typeface="Arial" charset="0"/>
-                          <a:hlinkClick r:id="rId8" action="ppaction://hlinkfile"/>
+                          <a:hlinkClick r:id="rId5" action="ppaction://hlinkfile"/>
                         </a:rPr>
                         <a:t>Pa_formatRoutePatch</a:t>
                       </a:r>
@@ -19531,7 +19531,7 @@
                           <a:latin typeface="Arial" charset="0"/>
                           <a:ea typeface="宋体" pitchFamily="2" charset="-122"/>
                           <a:cs typeface="Arial" charset="0"/>
-                          <a:hlinkClick r:id="rId9" action="ppaction://hlinkfile"/>
+                          <a:hlinkClick r:id="rId8" action="ppaction://hlinkfile"/>
                         </a:rPr>
                         <a:t>paPatchInfo_t</a:t>
                       </a:r>

</xml_diff>